<commit_message>
Veränderte Ordnerstruktur : Einen Dokumente und einen Development für die Scriptdateien
</commit_message>
<xml_diff>
--- a/29-Kugelbunt-Tom_Haupt-Corinna_Pfarr-Mirco_Schlichting-Leon_Schilings.pptx
+++ b/29-Kugelbunt-Tom_Haupt-Corinna_Pfarr-Mirco_Schlichting-Leon_Schilings.pptx
@@ -3822,15 +3822,7 @@
             <a:pPr algn="l"/>
             <a:r>
               <a:rPr lang="de-DE" dirty="0"/>
-              <a:t>Leon </a:t>
-            </a:r>
-            <a:r>
-              <a:rPr lang="de-DE" dirty="0" err="1"/>
-              <a:t>Schilings</a:t>
-            </a:r>
-            <a:r>
-              <a:rPr lang="de-DE" dirty="0"/>
-              <a:t>,</a:t>
+              <a:t>Leon Schillings,</a:t>
             </a:r>
           </a:p>
           <a:p>
@@ -5044,14 +5036,14 @@
           <p:nvPr>
             <p:extLst>
               <p:ext uri="{D42A27DB-BD31-4B8C-83A1-F6EECF244321}">
-                <p14:modId xmlns:p14="http://schemas.microsoft.com/office/powerpoint/2010/main" val="3418163454"/>
+                <p14:modId xmlns:p14="http://schemas.microsoft.com/office/powerpoint/2010/main" val="3242445435"/>
               </p:ext>
             </p:extLst>
           </p:nvPr>
         </p:nvGraphicFramePr>
         <p:xfrm>
           <a:off x="482600" y="2131058"/>
-          <a:ext cx="8128000" cy="2595880"/>
+          <a:ext cx="8128000" cy="3134360"/>
         </p:xfrm>
         <a:graphic>
           <a:graphicData uri="http://schemas.openxmlformats.org/drawingml/2006/table">
@@ -5267,7 +5259,7 @@
                     <a:p>
                       <a:r>
                         <a:rPr lang="de-DE" dirty="0"/>
-                        <a:t>Grundgerüst</a:t>
+                        <a:t>Grundgerüst / Umwelt</a:t>
                       </a:r>
                     </a:p>
                   </a:txBody>
@@ -5316,7 +5308,11 @@
                     <a:bodyPr/>
                     <a:lstStyle/>
                     <a:p>
-                      <a:endParaRPr lang="de-DE"/>
+                      <a:r>
+                        <a:rPr lang="de-DE" dirty="0" err="1"/>
+                        <a:t>Speedbooster</a:t>
+                      </a:r>
+                      <a:endParaRPr lang="de-DE" dirty="0"/>
                     </a:p>
                   </a:txBody>
                   <a:tcPr>
@@ -5364,7 +5360,10 @@
                     <a:bodyPr/>
                     <a:lstStyle/>
                     <a:p>
-                      <a:endParaRPr lang="de-DE" dirty="0"/>
+                      <a:r>
+                        <a:rPr lang="de-DE" dirty="0"/>
+                        <a:t>Gegner</a:t>
+                      </a:r>
                     </a:p>
                   </a:txBody>
                   <a:tcPr>
@@ -5522,7 +5521,10 @@
                     <a:bodyPr/>
                     <a:lstStyle/>
                     <a:p>
-                      <a:endParaRPr lang="de-DE" dirty="0"/>
+                      <a:r>
+                        <a:rPr lang="de-DE" dirty="0"/>
+                        <a:t>Sprünge</a:t>
+                      </a:r>
                     </a:p>
                   </a:txBody>
                   <a:tcPr>
@@ -5570,7 +5572,10 @@
                     <a:bodyPr/>
                     <a:lstStyle/>
                     <a:p>
-                      <a:endParaRPr lang="de-DE" dirty="0"/>
+                      <a:r>
+                        <a:rPr lang="de-DE" dirty="0"/>
+                        <a:t>Kameraführung</a:t>
+                      </a:r>
                     </a:p>
                   </a:txBody>
                   <a:tcPr>
@@ -5627,7 +5632,7 @@
                     <a:p>
                       <a:r>
                         <a:rPr lang="de-DE" dirty="0"/>
-                        <a:t>Level 1</a:t>
+                        <a:t>Erstellung Level 1</a:t>
                       </a:r>
                     </a:p>
                   </a:txBody>
@@ -5678,7 +5683,7 @@
                     <a:p>
                       <a:r>
                         <a:rPr lang="de-DE" dirty="0"/>
-                        <a:t>Level 2</a:t>
+                        <a:t>Erstellung Level 2</a:t>
                       </a:r>
                     </a:p>
                   </a:txBody>
@@ -5729,7 +5734,7 @@
                     <a:p>
                       <a:r>
                         <a:rPr lang="de-DE" dirty="0"/>
-                        <a:t>Level 3</a:t>
+                        <a:t>Erstellung Level 3</a:t>
                       </a:r>
                     </a:p>
                   </a:txBody>
@@ -5780,7 +5785,7 @@
                     <a:p>
                       <a:r>
                         <a:rPr lang="de-DE" dirty="0"/>
-                        <a:t>Level 4</a:t>
+                        <a:t>Erstellung Level 4</a:t>
                       </a:r>
                     </a:p>
                   </a:txBody>
@@ -5838,8 +5843,60 @@
                     <a:p>
                       <a:r>
                         <a:rPr lang="de-DE" dirty="0"/>
-                        <a:t>Audio?</a:t>
+                        <a:t>Audio</a:t>
                       </a:r>
+                    </a:p>
+                  </a:txBody>
+                  <a:tcPr>
+                    <a:lnL w="12700" cap="flat" cmpd="sng" algn="ctr">
+                      <a:solidFill>
+                        <a:schemeClr val="tx1"/>
+                      </a:solidFill>
+                      <a:prstDash val="solid"/>
+                      <a:round/>
+                      <a:headEnd type="none" w="med" len="med"/>
+                      <a:tailEnd type="none" w="med" len="med"/>
+                    </a:lnL>
+                    <a:lnR w="12700" cap="flat" cmpd="sng" algn="ctr">
+                      <a:solidFill>
+                        <a:schemeClr val="tx1"/>
+                      </a:solidFill>
+                      <a:prstDash val="solid"/>
+                      <a:round/>
+                      <a:headEnd type="none" w="med" len="med"/>
+                      <a:tailEnd type="none" w="med" len="med"/>
+                    </a:lnR>
+                    <a:lnT w="12700" cap="flat" cmpd="sng" algn="ctr">
+                      <a:solidFill>
+                        <a:schemeClr val="tx1"/>
+                      </a:solidFill>
+                      <a:prstDash val="solid"/>
+                      <a:round/>
+                      <a:headEnd type="none" w="med" len="med"/>
+                      <a:tailEnd type="none" w="med" len="med"/>
+                    </a:lnT>
+                    <a:lnB w="12700" cap="flat" cmpd="sng" algn="ctr">
+                      <a:solidFill>
+                        <a:schemeClr val="tx1"/>
+                      </a:solidFill>
+                      <a:prstDash val="solid"/>
+                      <a:round/>
+                      <a:headEnd type="none" w="med" len="med"/>
+                      <a:tailEnd type="none" w="med" len="med"/>
+                    </a:lnB>
+                    <a:noFill/>
+                  </a:tcPr>
+                </a:tc>
+                <a:tc>
+                  <a:txBody>
+                    <a:bodyPr/>
+                    <a:lstStyle/>
+                    <a:p>
+                      <a:r>
+                        <a:rPr lang="de-DE" dirty="0" err="1"/>
+                        <a:t>Credits</a:t>
+                      </a:r>
+                      <a:endParaRPr lang="de-DE" dirty="0"/>
                     </a:p>
                   </a:txBody>
                   <a:tcPr>
@@ -5889,7 +5946,7 @@
                     <a:p>
                       <a:r>
                         <a:rPr lang="de-DE" dirty="0"/>
-                        <a:t>…</a:t>
+                        <a:t>Umgebung / Hindernisse</a:t>
                       </a:r>
                     </a:p>
                   </a:txBody>
@@ -5938,54 +5995,14 @@
                     <a:bodyPr/>
                     <a:lstStyle/>
                     <a:p>
-                      <a:endParaRPr lang="de-DE" dirty="0"/>
-                    </a:p>
-                  </a:txBody>
-                  <a:tcPr>
-                    <a:lnL w="12700" cap="flat" cmpd="sng" algn="ctr">
-                      <a:solidFill>
-                        <a:schemeClr val="tx1"/>
-                      </a:solidFill>
-                      <a:prstDash val="solid"/>
-                      <a:round/>
-                      <a:headEnd type="none" w="med" len="med"/>
-                      <a:tailEnd type="none" w="med" len="med"/>
-                    </a:lnL>
-                    <a:lnR w="12700" cap="flat" cmpd="sng" algn="ctr">
-                      <a:solidFill>
-                        <a:schemeClr val="tx1"/>
-                      </a:solidFill>
-                      <a:prstDash val="solid"/>
-                      <a:round/>
-                      <a:headEnd type="none" w="med" len="med"/>
-                      <a:tailEnd type="none" w="med" len="med"/>
-                    </a:lnR>
-                    <a:lnT w="12700" cap="flat" cmpd="sng" algn="ctr">
-                      <a:solidFill>
-                        <a:schemeClr val="tx1"/>
-                      </a:solidFill>
-                      <a:prstDash val="solid"/>
-                      <a:round/>
-                      <a:headEnd type="none" w="med" len="med"/>
-                      <a:tailEnd type="none" w="med" len="med"/>
-                    </a:lnT>
-                    <a:lnB w="12700" cap="flat" cmpd="sng" algn="ctr">
-                      <a:solidFill>
-                        <a:schemeClr val="tx1"/>
-                      </a:solidFill>
-                      <a:prstDash val="solid"/>
-                      <a:round/>
-                      <a:headEnd type="none" w="med" len="med"/>
-                      <a:tailEnd type="none" w="med" len="med"/>
-                    </a:lnB>
-                    <a:noFill/>
-                  </a:tcPr>
-                </a:tc>
-                <a:tc>
-                  <a:txBody>
-                    <a:bodyPr/>
-                    <a:lstStyle/>
-                    <a:p>
+                      <a:r>
+                        <a:rPr lang="de-DE" dirty="0"/>
+                        <a:t>Checkpoints / </a:t>
+                      </a:r>
+                      <a:r>
+                        <a:rPr lang="de-DE" dirty="0" err="1"/>
+                        <a:t>Respawn</a:t>
+                      </a:r>
                       <a:endParaRPr lang="de-DE" dirty="0"/>
                     </a:p>
                   </a:txBody>
@@ -6041,7 +6058,7 @@
                     <a:bodyPr/>
                     <a:lstStyle/>
                     <a:p>
-                      <a:endParaRPr lang="de-DE"/>
+                      <a:endParaRPr lang="de-DE" dirty="0"/>
                     </a:p>
                   </a:txBody>
                   <a:tcPr>
@@ -6948,14 +6965,14 @@
             <p:ph idx="1"/>
             <p:extLst>
               <p:ext uri="{D42A27DB-BD31-4B8C-83A1-F6EECF244321}">
-                <p14:modId xmlns:p14="http://schemas.microsoft.com/office/powerpoint/2010/main" val="803405534"/>
+                <p14:modId xmlns:p14="http://schemas.microsoft.com/office/powerpoint/2010/main" val="1302616519"/>
               </p:ext>
             </p:extLst>
           </p:nvPr>
         </p:nvGraphicFramePr>
         <p:xfrm>
-          <a:off x="642931" y="1823423"/>
-          <a:ext cx="7858744" cy="3291840"/>
+          <a:off x="642930" y="1703691"/>
+          <a:ext cx="7967670" cy="5212080"/>
         </p:xfrm>
         <a:graphic>
           <a:graphicData uri="http://schemas.openxmlformats.org/drawingml/2006/table">
@@ -6964,38 +6981,31 @@
                 <a:tableStyleId>{5C22544A-7EE6-4342-B048-85BDC9FD1C3A}</a:tableStyleId>
               </a:tblPr>
               <a:tblGrid>
-                <a:gridCol w="1542397">
+                <a:gridCol w="2024828">
                   <a:extLst>
                     <a:ext uri="{9D8B030D-6E8A-4147-A177-3AD203B41FA5}">
                       <a16:colId xmlns:a16="http://schemas.microsoft.com/office/drawing/2014/main" val="3338812544"/>
                     </a:ext>
                   </a:extLst>
                 </a:gridCol>
-                <a:gridCol w="522732">
+                <a:gridCol w="686232">
                   <a:extLst>
                     <a:ext uri="{9D8B030D-6E8A-4147-A177-3AD203B41FA5}">
                       <a16:colId xmlns:a16="http://schemas.microsoft.com/office/drawing/2014/main" val="1174370805"/>
                     </a:ext>
                   </a:extLst>
                 </a:gridCol>
-                <a:gridCol w="2002091">
+                <a:gridCol w="2628305">
                   <a:extLst>
                     <a:ext uri="{9D8B030D-6E8A-4147-A177-3AD203B41FA5}">
                       <a16:colId xmlns:a16="http://schemas.microsoft.com/office/drawing/2014/main" val="2923646251"/>
                     </a:ext>
                   </a:extLst>
                 </a:gridCol>
-                <a:gridCol w="2002091">
+                <a:gridCol w="2628305">
                   <a:extLst>
                     <a:ext uri="{9D8B030D-6E8A-4147-A177-3AD203B41FA5}">
                       <a16:colId xmlns:a16="http://schemas.microsoft.com/office/drawing/2014/main" val="2782857795"/>
-                    </a:ext>
-                  </a:extLst>
-                </a:gridCol>
-                <a:gridCol w="1789433">
-                  <a:extLst>
-                    <a:ext uri="{9D8B030D-6E8A-4147-A177-3AD203B41FA5}">
-                      <a16:colId xmlns:a16="http://schemas.microsoft.com/office/drawing/2014/main" val="1242463116"/>
                     </a:ext>
                   </a:extLst>
                 </a:gridCol>
@@ -7097,35 +7107,6 @@
                       <a:r>
                         <a:rPr lang="de-DE" dirty="0"/>
                         <a:t>Was? </a:t>
-                      </a:r>
-                    </a:p>
-                  </a:txBody>
-                  <a:tcPr>
-                    <a:lnB w="12700" cap="flat" cmpd="sng" algn="ctr">
-                      <a:solidFill>
-                        <a:schemeClr val="tx1"/>
-                      </a:solidFill>
-                      <a:prstDash val="solid"/>
-                      <a:round/>
-                      <a:headEnd type="none" w="med" len="med"/>
-                      <a:tailEnd type="none" w="med" len="med"/>
-                    </a:lnB>
-                    <a:solidFill>
-                      <a:schemeClr val="tx2">
-                        <a:lumMod val="75000"/>
-                      </a:schemeClr>
-                    </a:solidFill>
-                  </a:tcPr>
-                </a:tc>
-                <a:tc>
-                  <a:txBody>
-                    <a:bodyPr/>
-                    <a:lstStyle/>
-                    <a:p>
-                      <a:pPr algn="ctr"/>
-                      <a:r>
-                        <a:rPr lang="de-DE" dirty="0"/>
-                        <a:t>Bis wann?</a:t>
                       </a:r>
                     </a:p>
                   </a:txBody>
@@ -7263,7 +7244,10 @@
                     <a:lstStyle/>
                     <a:p>
                       <a:pPr algn="ctr"/>
-                      <a:endParaRPr lang="de-DE" dirty="0"/>
+                      <a:r>
+                        <a:rPr lang="de-DE" dirty="0"/>
+                        <a:t>Corinna</a:t>
+                      </a:r>
                     </a:p>
                   </a:txBody>
                   <a:tcPr>
@@ -7312,56 +7296,10 @@
                     <a:lstStyle/>
                     <a:p>
                       <a:pPr algn="ctr"/>
-                      <a:endParaRPr lang="de-DE" dirty="0"/>
-                    </a:p>
-                  </a:txBody>
-                  <a:tcPr>
-                    <a:lnL w="12700" cap="flat" cmpd="sng" algn="ctr">
-                      <a:solidFill>
-                        <a:schemeClr val="tx1"/>
-                      </a:solidFill>
-                      <a:prstDash val="solid"/>
-                      <a:round/>
-                      <a:headEnd type="none" w="med" len="med"/>
-                      <a:tailEnd type="none" w="med" len="med"/>
-                    </a:lnL>
-                    <a:lnR w="12700" cap="flat" cmpd="sng" algn="ctr">
-                      <a:solidFill>
-                        <a:schemeClr val="tx1"/>
-                      </a:solidFill>
-                      <a:prstDash val="solid"/>
-                      <a:round/>
-                      <a:headEnd type="none" w="med" len="med"/>
-                      <a:tailEnd type="none" w="med" len="med"/>
-                    </a:lnR>
-                    <a:lnT w="12700" cap="flat" cmpd="sng" algn="ctr">
-                      <a:solidFill>
-                        <a:schemeClr val="tx1"/>
-                      </a:solidFill>
-                      <a:prstDash val="solid"/>
-                      <a:round/>
-                      <a:headEnd type="none" w="med" len="med"/>
-                      <a:tailEnd type="none" w="med" len="med"/>
-                    </a:lnT>
-                    <a:lnB w="12700" cap="flat" cmpd="sng" algn="ctr">
-                      <a:solidFill>
-                        <a:schemeClr val="tx1"/>
-                      </a:solidFill>
-                      <a:prstDash val="solid"/>
-                      <a:round/>
-                      <a:headEnd type="none" w="med" len="med"/>
-                      <a:tailEnd type="none" w="med" len="med"/>
-                    </a:lnB>
-                    <a:noFill/>
-                  </a:tcPr>
-                </a:tc>
-                <a:tc>
-                  <a:txBody>
-                    <a:bodyPr/>
-                    <a:lstStyle/>
-                    <a:p>
-                      <a:pPr algn="ctr"/>
-                      <a:endParaRPr lang="de-DE" dirty="0"/>
+                      <a:r>
+                        <a:rPr lang="de-DE" dirty="0"/>
+                        <a:t>Grundgerüst</a:t>
+                      </a:r>
                     </a:p>
                   </a:txBody>
                   <a:tcPr>
@@ -7521,7 +7459,10 @@
                     <a:lstStyle/>
                     <a:p>
                       <a:pPr algn="ctr"/>
-                      <a:endParaRPr lang="de-DE" dirty="0"/>
+                      <a:r>
+                        <a:rPr lang="de-DE" dirty="0"/>
+                        <a:t>Corinna</a:t>
+                      </a:r>
                     </a:p>
                   </a:txBody>
                   <a:tcPr>
@@ -7570,55 +7511,10 @@
                     <a:lstStyle/>
                     <a:p>
                       <a:pPr algn="ctr"/>
-                      <a:endParaRPr lang="de-DE" dirty="0"/>
-                    </a:p>
-                  </a:txBody>
-                  <a:tcPr>
-                    <a:lnL w="12700" cap="flat" cmpd="sng" algn="ctr">
-                      <a:solidFill>
-                        <a:schemeClr val="tx1"/>
-                      </a:solidFill>
-                      <a:prstDash val="solid"/>
-                      <a:round/>
-                      <a:headEnd type="none" w="med" len="med"/>
-                      <a:tailEnd type="none" w="med" len="med"/>
-                    </a:lnL>
-                    <a:lnR w="12700" cap="flat" cmpd="sng" algn="ctr">
-                      <a:solidFill>
-                        <a:schemeClr val="tx1"/>
-                      </a:solidFill>
-                      <a:prstDash val="solid"/>
-                      <a:round/>
-                      <a:headEnd type="none" w="med" len="med"/>
-                      <a:tailEnd type="none" w="med" len="med"/>
-                    </a:lnR>
-                    <a:lnT w="12700" cap="flat" cmpd="sng" algn="ctr">
-                      <a:solidFill>
-                        <a:schemeClr val="tx1"/>
-                      </a:solidFill>
-                      <a:prstDash val="solid"/>
-                      <a:round/>
-                      <a:headEnd type="none" w="med" len="med"/>
-                      <a:tailEnd type="none" w="med" len="med"/>
-                    </a:lnT>
-                    <a:lnB w="12700" cap="flat" cmpd="sng" algn="ctr">
-                      <a:solidFill>
-                        <a:schemeClr val="tx1"/>
-                      </a:solidFill>
-                      <a:prstDash val="solid"/>
-                      <a:round/>
-                      <a:headEnd type="none" w="med" len="med"/>
-                      <a:tailEnd type="none" w="med" len="med"/>
-                    </a:lnB>
-                    <a:noFill/>
-                  </a:tcPr>
-                </a:tc>
-                <a:tc>
-                  <a:txBody>
-                    <a:bodyPr/>
-                    <a:lstStyle/>
-                    <a:p>
-                      <a:pPr algn="ctr"/>
+                      <a:r>
+                        <a:rPr lang="de-DE" dirty="0" err="1"/>
+                        <a:t>Sphere</a:t>
+                      </a:r>
                       <a:endParaRPr lang="de-DE" dirty="0"/>
                     </a:p>
                   </a:txBody>
@@ -7779,7 +7675,10 @@
                     <a:lstStyle/>
                     <a:p>
                       <a:pPr algn="ctr"/>
-                      <a:endParaRPr lang="de-DE" dirty="0"/>
+                      <a:r>
+                        <a:rPr lang="de-DE" dirty="0"/>
+                        <a:t>Corinna</a:t>
+                      </a:r>
                     </a:p>
                   </a:txBody>
                   <a:tcPr>
@@ -7828,56 +7727,11 @@
                     <a:lstStyle/>
                     <a:p>
                       <a:pPr algn="ctr"/>
-                      <a:endParaRPr lang="de-DE"/>
-                    </a:p>
-                  </a:txBody>
-                  <a:tcPr>
-                    <a:lnL w="12700" cap="flat" cmpd="sng" algn="ctr">
-                      <a:solidFill>
-                        <a:schemeClr val="tx1"/>
-                      </a:solidFill>
-                      <a:prstDash val="solid"/>
-                      <a:round/>
-                      <a:headEnd type="none" w="med" len="med"/>
-                      <a:tailEnd type="none" w="med" len="med"/>
-                    </a:lnL>
-                    <a:lnR w="12700" cap="flat" cmpd="sng" algn="ctr">
-                      <a:solidFill>
-                        <a:schemeClr val="tx1"/>
-                      </a:solidFill>
-                      <a:prstDash val="solid"/>
-                      <a:round/>
-                      <a:headEnd type="none" w="med" len="med"/>
-                      <a:tailEnd type="none" w="med" len="med"/>
-                    </a:lnR>
-                    <a:lnT w="12700" cap="flat" cmpd="sng" algn="ctr">
-                      <a:solidFill>
-                        <a:schemeClr val="tx1"/>
-                      </a:solidFill>
-                      <a:prstDash val="solid"/>
-                      <a:round/>
-                      <a:headEnd type="none" w="med" len="med"/>
-                      <a:tailEnd type="none" w="med" len="med"/>
-                    </a:lnT>
-                    <a:lnB w="12700" cap="flat" cmpd="sng" algn="ctr">
-                      <a:solidFill>
-                        <a:schemeClr val="tx1"/>
-                      </a:solidFill>
-                      <a:prstDash val="solid"/>
-                      <a:round/>
-                      <a:headEnd type="none" w="med" len="med"/>
-                      <a:tailEnd type="none" w="med" len="med"/>
-                    </a:lnB>
-                    <a:noFill/>
-                  </a:tcPr>
-                </a:tc>
-                <a:tc>
-                  <a:txBody>
-                    <a:bodyPr/>
-                    <a:lstStyle/>
-                    <a:p>
-                      <a:pPr algn="ctr"/>
-                      <a:endParaRPr lang="de-DE"/>
+                      <a:r>
+                        <a:rPr lang="de-DE" dirty="0" err="1"/>
+                        <a:t>Sphere</a:t>
+                      </a:r>
+                      <a:endParaRPr lang="de-DE" dirty="0"/>
                     </a:p>
                   </a:txBody>
                   <a:tcPr>
@@ -7926,7 +7780,7 @@
                   </a:ext>
                 </a:extLst>
               </a:tr>
-              <a:tr h="333375">
+              <a:tr h="264107">
                 <a:tc>
                   <a:txBody>
                     <a:bodyPr/>
@@ -8044,7 +7898,10 @@
                     <a:lstStyle/>
                     <a:p>
                       <a:pPr algn="ctr"/>
-                      <a:endParaRPr lang="de-DE" dirty="0"/>
+                      <a:r>
+                        <a:rPr lang="de-DE" dirty="0"/>
+                        <a:t>Corinna</a:t>
+                      </a:r>
                     </a:p>
                   </a:txBody>
                   <a:tcPr>
@@ -8099,63 +7956,9 @@
                     <a:p>
                       <a:pPr algn="ctr"/>
                       <a:r>
-                        <a:rPr lang="de-DE" dirty="0"/>
-                        <a:t>Meilenstein 1</a:t>
+                        <a:rPr lang="de-DE" b="1" dirty="0"/>
+                        <a:t>Meilenstein1: Kugeleigenschaften fertiggestellt</a:t>
                       </a:r>
-                    </a:p>
-                  </a:txBody>
-                  <a:tcPr>
-                    <a:lnL w="12700" cap="flat" cmpd="sng" algn="ctr">
-                      <a:solidFill>
-                        <a:schemeClr val="tx1"/>
-                      </a:solidFill>
-                      <a:prstDash val="solid"/>
-                      <a:round/>
-                      <a:headEnd type="none" w="med" len="med"/>
-                      <a:tailEnd type="none" w="med" len="med"/>
-                    </a:lnL>
-                    <a:lnR w="12700" cap="flat" cmpd="sng" algn="ctr">
-                      <a:solidFill>
-                        <a:schemeClr val="tx1"/>
-                      </a:solidFill>
-                      <a:prstDash val="solid"/>
-                      <a:round/>
-                      <a:headEnd type="none" w="med" len="med"/>
-                      <a:tailEnd type="none" w="med" len="med"/>
-                    </a:lnR>
-                    <a:lnT w="12700" cap="flat" cmpd="sng" algn="ctr">
-                      <a:solidFill>
-                        <a:schemeClr val="tx1"/>
-                      </a:solidFill>
-                      <a:prstDash val="solid"/>
-                      <a:round/>
-                      <a:headEnd type="none" w="med" len="med"/>
-                      <a:tailEnd type="none" w="med" len="med"/>
-                    </a:lnT>
-                    <a:lnB w="12700" cap="flat" cmpd="sng" algn="ctr">
-                      <a:solidFill>
-                        <a:schemeClr val="tx1"/>
-                      </a:solidFill>
-                      <a:prstDash val="solid"/>
-                      <a:round/>
-                      <a:headEnd type="none" w="med" len="med"/>
-                      <a:tailEnd type="none" w="med" len="med"/>
-                    </a:lnB>
-                    <a:solidFill>
-                      <a:schemeClr val="accent2">
-                        <a:lumMod val="20000"/>
-                        <a:lumOff val="80000"/>
-                      </a:schemeClr>
-                    </a:solidFill>
-                  </a:tcPr>
-                </a:tc>
-                <a:tc>
-                  <a:txBody>
-                    <a:bodyPr/>
-                    <a:lstStyle/>
-                    <a:p>
-                      <a:pPr algn="ctr"/>
-                      <a:endParaRPr lang="de-DE" dirty="0"/>
                     </a:p>
                   </a:txBody>
                   <a:tcPr>
@@ -8320,7 +8123,18 @@
                     <a:lstStyle/>
                     <a:p>
                       <a:pPr algn="ctr"/>
-                      <a:endParaRPr lang="de-DE"/>
+                      <a:r>
+                        <a:rPr lang="de-DE" dirty="0"/>
+                        <a:t>Corinna / </a:t>
+                      </a:r>
+                      <a:r>
+                        <a:rPr lang="de-DE" dirty="0">
+                          <a:solidFill>
+                            <a:schemeClr val="accent1"/>
+                          </a:solidFill>
+                        </a:rPr>
+                        <a:t>Mirco</a:t>
+                      </a:r>
                     </a:p>
                   </a:txBody>
                   <a:tcPr>
@@ -8369,56 +8183,23 @@
                     <a:lstStyle/>
                     <a:p>
                       <a:pPr algn="ctr"/>
-                      <a:endParaRPr lang="de-DE" dirty="0"/>
-                    </a:p>
-                  </a:txBody>
-                  <a:tcPr>
-                    <a:lnL w="12700" cap="flat" cmpd="sng" algn="ctr">
-                      <a:solidFill>
-                        <a:schemeClr val="tx1"/>
-                      </a:solidFill>
-                      <a:prstDash val="solid"/>
-                      <a:round/>
-                      <a:headEnd type="none" w="med" len="med"/>
-                      <a:tailEnd type="none" w="med" len="med"/>
-                    </a:lnL>
-                    <a:lnR w="12700" cap="flat" cmpd="sng" algn="ctr">
-                      <a:solidFill>
-                        <a:schemeClr val="tx1"/>
-                      </a:solidFill>
-                      <a:prstDash val="solid"/>
-                      <a:round/>
-                      <a:headEnd type="none" w="med" len="med"/>
-                      <a:tailEnd type="none" w="med" len="med"/>
-                    </a:lnR>
-                    <a:lnT w="12700" cap="flat" cmpd="sng" algn="ctr">
-                      <a:solidFill>
-                        <a:schemeClr val="tx1"/>
-                      </a:solidFill>
-                      <a:prstDash val="solid"/>
-                      <a:round/>
-                      <a:headEnd type="none" w="med" len="med"/>
-                      <a:tailEnd type="none" w="med" len="med"/>
-                    </a:lnT>
-                    <a:lnB w="12700" cap="flat" cmpd="sng" algn="ctr">
-                      <a:solidFill>
-                        <a:schemeClr val="tx1"/>
-                      </a:solidFill>
-                      <a:prstDash val="solid"/>
-                      <a:round/>
-                      <a:headEnd type="none" w="med" len="med"/>
-                      <a:tailEnd type="none" w="med" len="med"/>
-                    </a:lnB>
-                    <a:noFill/>
-                  </a:tcPr>
-                </a:tc>
-                <a:tc>
-                  <a:txBody>
-                    <a:bodyPr/>
-                    <a:lstStyle/>
-                    <a:p>
-                      <a:pPr algn="ctr"/>
-                      <a:endParaRPr lang="de-DE" dirty="0"/>
+                      <a:r>
+                        <a:rPr lang="de-DE" dirty="0"/>
+                        <a:t>Level Strecke / </a:t>
+                      </a:r>
+                      <a:r>
+                        <a:rPr lang="de-DE" dirty="0" err="1">
+                          <a:solidFill>
+                            <a:schemeClr val="accent1"/>
+                          </a:solidFill>
+                        </a:rPr>
+                        <a:t>Speedbooster</a:t>
+                      </a:r>
+                      <a:endParaRPr lang="de-DE" dirty="0">
+                        <a:solidFill>
+                          <a:schemeClr val="accent1"/>
+                        </a:solidFill>
+                      </a:endParaRPr>
                     </a:p>
                   </a:txBody>
                   <a:tcPr>
@@ -8578,7 +8359,18 @@
                     <a:lstStyle/>
                     <a:p>
                       <a:pPr algn="ctr"/>
-                      <a:endParaRPr lang="de-DE"/>
+                      <a:r>
+                        <a:rPr lang="de-DE" dirty="0"/>
+                        <a:t>Corinna / </a:t>
+                      </a:r>
+                      <a:r>
+                        <a:rPr lang="de-DE" dirty="0">
+                          <a:solidFill>
+                            <a:schemeClr val="accent1"/>
+                          </a:solidFill>
+                        </a:rPr>
+                        <a:t>Mirco</a:t>
+                      </a:r>
                     </a:p>
                   </a:txBody>
                   <a:tcPr>
@@ -8627,56 +8419,18 @@
                     <a:lstStyle/>
                     <a:p>
                       <a:pPr algn="ctr"/>
-                      <a:endParaRPr lang="de-DE" dirty="0"/>
-                    </a:p>
-                  </a:txBody>
-                  <a:tcPr>
-                    <a:lnL w="12700" cap="flat" cmpd="sng" algn="ctr">
-                      <a:solidFill>
-                        <a:schemeClr val="tx1"/>
-                      </a:solidFill>
-                      <a:prstDash val="solid"/>
-                      <a:round/>
-                      <a:headEnd type="none" w="med" len="med"/>
-                      <a:tailEnd type="none" w="med" len="med"/>
-                    </a:lnL>
-                    <a:lnR w="12700" cap="flat" cmpd="sng" algn="ctr">
-                      <a:solidFill>
-                        <a:schemeClr val="tx1"/>
-                      </a:solidFill>
-                      <a:prstDash val="solid"/>
-                      <a:round/>
-                      <a:headEnd type="none" w="med" len="med"/>
-                      <a:tailEnd type="none" w="med" len="med"/>
-                    </a:lnR>
-                    <a:lnT w="12700" cap="flat" cmpd="sng" algn="ctr">
-                      <a:solidFill>
-                        <a:schemeClr val="tx1"/>
-                      </a:solidFill>
-                      <a:prstDash val="solid"/>
-                      <a:round/>
-                      <a:headEnd type="none" w="med" len="med"/>
-                      <a:tailEnd type="none" w="med" len="med"/>
-                    </a:lnT>
-                    <a:lnB w="12700" cap="flat" cmpd="sng" algn="ctr">
-                      <a:solidFill>
-                        <a:schemeClr val="tx1"/>
-                      </a:solidFill>
-                      <a:prstDash val="solid"/>
-                      <a:round/>
-                      <a:headEnd type="none" w="med" len="med"/>
-                      <a:tailEnd type="none" w="med" len="med"/>
-                    </a:lnB>
-                    <a:noFill/>
-                  </a:tcPr>
-                </a:tc>
-                <a:tc>
-                  <a:txBody>
-                    <a:bodyPr/>
-                    <a:lstStyle/>
-                    <a:p>
-                      <a:pPr algn="ctr"/>
-                      <a:endParaRPr lang="de-DE"/>
+                      <a:r>
+                        <a:rPr lang="de-DE" dirty="0"/>
+                        <a:t>Level Umgebung / </a:t>
+                      </a:r>
+                      <a:r>
+                        <a:rPr lang="de-DE" dirty="0">
+                          <a:solidFill>
+                            <a:schemeClr val="accent1"/>
+                          </a:solidFill>
+                        </a:rPr>
+                        <a:t>Sprünge</a:t>
+                      </a:r>
                     </a:p>
                   </a:txBody>
                   <a:tcPr>
@@ -8836,7 +8590,10 @@
                     <a:lstStyle/>
                     <a:p>
                       <a:pPr algn="ctr"/>
-                      <a:endParaRPr lang="de-DE" dirty="0"/>
+                      <a:r>
+                        <a:rPr lang="de-DE" dirty="0"/>
+                        <a:t>Corinna /Mirco</a:t>
+                      </a:r>
                     </a:p>
                   </a:txBody>
                   <a:tcPr>
@@ -8885,56 +8642,18 @@
                     <a:lstStyle/>
                     <a:p>
                       <a:pPr algn="ctr"/>
-                      <a:endParaRPr lang="de-DE" dirty="0"/>
-                    </a:p>
-                  </a:txBody>
-                  <a:tcPr>
-                    <a:lnL w="12700" cap="flat" cmpd="sng" algn="ctr">
-                      <a:solidFill>
-                        <a:schemeClr val="tx1"/>
-                      </a:solidFill>
-                      <a:prstDash val="solid"/>
-                      <a:round/>
-                      <a:headEnd type="none" w="med" len="med"/>
-                      <a:tailEnd type="none" w="med" len="med"/>
-                    </a:lnL>
-                    <a:lnR w="12700" cap="flat" cmpd="sng" algn="ctr">
-                      <a:solidFill>
-                        <a:schemeClr val="tx1"/>
-                      </a:solidFill>
-                      <a:prstDash val="solid"/>
-                      <a:round/>
-                      <a:headEnd type="none" w="med" len="med"/>
-                      <a:tailEnd type="none" w="med" len="med"/>
-                    </a:lnR>
-                    <a:lnT w="12700" cap="flat" cmpd="sng" algn="ctr">
-                      <a:solidFill>
-                        <a:schemeClr val="tx1"/>
-                      </a:solidFill>
-                      <a:prstDash val="solid"/>
-                      <a:round/>
-                      <a:headEnd type="none" w="med" len="med"/>
-                      <a:tailEnd type="none" w="med" len="med"/>
-                    </a:lnT>
-                    <a:lnB w="12700" cap="flat" cmpd="sng" algn="ctr">
-                      <a:solidFill>
-                        <a:schemeClr val="tx1"/>
-                      </a:solidFill>
-                      <a:prstDash val="solid"/>
-                      <a:round/>
-                      <a:headEnd type="none" w="med" len="med"/>
-                      <a:tailEnd type="none" w="med" len="med"/>
-                    </a:lnB>
-                    <a:noFill/>
-                  </a:tcPr>
-                </a:tc>
-                <a:tc>
-                  <a:txBody>
-                    <a:bodyPr/>
-                    <a:lstStyle/>
-                    <a:p>
-                      <a:pPr algn="ctr"/>
-                      <a:endParaRPr lang="de-DE" dirty="0"/>
+                      <a:r>
+                        <a:rPr lang="de-DE" dirty="0"/>
+                        <a:t>Level Abschnitt 1 / </a:t>
+                      </a:r>
+                      <a:r>
+                        <a:rPr lang="de-DE" dirty="0">
+                          <a:solidFill>
+                            <a:srgbClr val="0070C0"/>
+                          </a:solidFill>
+                        </a:rPr>
+                        <a:t>Sounds und Musik</a:t>
+                      </a:r>
                     </a:p>
                   </a:txBody>
                   <a:tcPr>
@@ -8991,7 +8710,7 @@
                     <a:p>
                       <a:pPr algn="ctr"/>
                       <a:r>
-                        <a:rPr lang="de-DE" dirty="0"/>
+                        <a:rPr lang="de-DE" b="1" dirty="0"/>
                         <a:t>01.08.18</a:t>
                       </a:r>
                     </a:p>
@@ -9101,7 +8820,10 @@
                     <a:lstStyle/>
                     <a:p>
                       <a:pPr algn="ctr"/>
-                      <a:endParaRPr lang="de-DE" dirty="0"/>
+                      <a:r>
+                        <a:rPr lang="de-DE" dirty="0"/>
+                        <a:t>alle</a:t>
+                      </a:r>
                     </a:p>
                   </a:txBody>
                   <a:tcPr>
@@ -9156,63 +8878,9 @@
                     <a:p>
                       <a:pPr algn="ctr"/>
                       <a:r>
-                        <a:rPr lang="de-DE" dirty="0"/>
-                        <a:t>Meilenstein 2</a:t>
+                        <a:rPr lang="de-DE" b="1" dirty="0"/>
+                        <a:t>Meilenstein 2: Beginn Programmierung der Level </a:t>
                       </a:r>
-                    </a:p>
-                  </a:txBody>
-                  <a:tcPr>
-                    <a:lnL w="12700" cap="flat" cmpd="sng" algn="ctr">
-                      <a:solidFill>
-                        <a:schemeClr val="tx1"/>
-                      </a:solidFill>
-                      <a:prstDash val="solid"/>
-                      <a:round/>
-                      <a:headEnd type="none" w="med" len="med"/>
-                      <a:tailEnd type="none" w="med" len="med"/>
-                    </a:lnL>
-                    <a:lnR w="12700" cap="flat" cmpd="sng" algn="ctr">
-                      <a:solidFill>
-                        <a:schemeClr val="tx1"/>
-                      </a:solidFill>
-                      <a:prstDash val="solid"/>
-                      <a:round/>
-                      <a:headEnd type="none" w="med" len="med"/>
-                      <a:tailEnd type="none" w="med" len="med"/>
-                    </a:lnR>
-                    <a:lnT w="12700" cap="flat" cmpd="sng" algn="ctr">
-                      <a:solidFill>
-                        <a:schemeClr val="tx1"/>
-                      </a:solidFill>
-                      <a:prstDash val="solid"/>
-                      <a:round/>
-                      <a:headEnd type="none" w="med" len="med"/>
-                      <a:tailEnd type="none" w="med" len="med"/>
-                    </a:lnT>
-                    <a:lnB w="12700" cap="flat" cmpd="sng" algn="ctr">
-                      <a:solidFill>
-                        <a:schemeClr val="tx1"/>
-                      </a:solidFill>
-                      <a:prstDash val="solid"/>
-                      <a:round/>
-                      <a:headEnd type="none" w="med" len="med"/>
-                      <a:tailEnd type="none" w="med" len="med"/>
-                    </a:lnB>
-                    <a:solidFill>
-                      <a:schemeClr val="accent2">
-                        <a:lumMod val="20000"/>
-                        <a:lumOff val="80000"/>
-                      </a:schemeClr>
-                    </a:solidFill>
-                  </a:tcPr>
-                </a:tc>
-                <a:tc>
-                  <a:txBody>
-                    <a:bodyPr/>
-                    <a:lstStyle/>
-                    <a:p>
-                      <a:pPr algn="ctr"/>
-                      <a:endParaRPr lang="de-DE" dirty="0"/>
                     </a:p>
                   </a:txBody>
                   <a:tcPr>
@@ -9552,7 +9220,7 @@
         </p:nvSpPr>
         <p:spPr>
           <a:xfrm>
-            <a:off x="1136428" y="627564"/>
+            <a:off x="1136428" y="85685"/>
             <a:ext cx="7474172" cy="1325563"/>
           </a:xfrm>
         </p:spPr>
@@ -9780,14 +9448,14 @@
           <p:nvPr>
             <p:extLst>
               <p:ext uri="{D42A27DB-BD31-4B8C-83A1-F6EECF244321}">
-                <p14:modId xmlns:p14="http://schemas.microsoft.com/office/powerpoint/2010/main" val="473840676"/>
+                <p14:modId xmlns:p14="http://schemas.microsoft.com/office/powerpoint/2010/main" val="226155222"/>
               </p:ext>
             </p:extLst>
           </p:nvPr>
         </p:nvGraphicFramePr>
         <p:xfrm>
-          <a:off x="510981" y="1849714"/>
-          <a:ext cx="8292150" cy="4297680"/>
+          <a:off x="703512" y="1004126"/>
+          <a:ext cx="8099619" cy="6492240"/>
         </p:xfrm>
         <a:graphic>
           <a:graphicData uri="http://schemas.openxmlformats.org/drawingml/2006/table">
@@ -9796,38 +9464,31 @@
                 <a:tableStyleId>{5C22544A-7EE6-4342-B048-85BDC9FD1C3A}</a:tableStyleId>
               </a:tblPr>
               <a:tblGrid>
-                <a:gridCol w="1565593">
+                <a:gridCol w="2011162">
                   <a:extLst>
                     <a:ext uri="{9D8B030D-6E8A-4147-A177-3AD203B41FA5}">
                       <a16:colId xmlns:a16="http://schemas.microsoft.com/office/drawing/2014/main" val="2560074682"/>
                     </a:ext>
                   </a:extLst>
                 </a:gridCol>
-                <a:gridCol w="519758">
+                <a:gridCol w="667682">
                   <a:extLst>
                     <a:ext uri="{9D8B030D-6E8A-4147-A177-3AD203B41FA5}">
                       <a16:colId xmlns:a16="http://schemas.microsoft.com/office/drawing/2014/main" val="385089624"/>
                     </a:ext>
                   </a:extLst>
                 </a:gridCol>
-                <a:gridCol w="1996690">
+                <a:gridCol w="2564950">
                   <a:extLst>
                     <a:ext uri="{9D8B030D-6E8A-4147-A177-3AD203B41FA5}">
                       <a16:colId xmlns:a16="http://schemas.microsoft.com/office/drawing/2014/main" val="3639024571"/>
                     </a:ext>
                   </a:extLst>
                 </a:gridCol>
-                <a:gridCol w="2223122">
+                <a:gridCol w="2855825">
                   <a:extLst>
                     <a:ext uri="{9D8B030D-6E8A-4147-A177-3AD203B41FA5}">
                       <a16:colId xmlns:a16="http://schemas.microsoft.com/office/drawing/2014/main" val="3716286981"/>
-                    </a:ext>
-                  </a:extLst>
-                </a:gridCol>
-                <a:gridCol w="1986987">
-                  <a:extLst>
-                    <a:ext uri="{9D8B030D-6E8A-4147-A177-3AD203B41FA5}">
-                      <a16:colId xmlns:a16="http://schemas.microsoft.com/office/drawing/2014/main" val="2116758181"/>
                     </a:ext>
                   </a:extLst>
                 </a:gridCol>
@@ -9929,35 +9590,6 @@
                       <a:r>
                         <a:rPr lang="de-DE" dirty="0"/>
                         <a:t>Was?</a:t>
-                      </a:r>
-                    </a:p>
-                  </a:txBody>
-                  <a:tcPr>
-                    <a:lnB w="12700" cap="flat" cmpd="sng" algn="ctr">
-                      <a:solidFill>
-                        <a:schemeClr val="tx1"/>
-                      </a:solidFill>
-                      <a:prstDash val="solid"/>
-                      <a:round/>
-                      <a:headEnd type="none" w="med" len="med"/>
-                      <a:tailEnd type="none" w="med" len="med"/>
-                    </a:lnB>
-                    <a:solidFill>
-                      <a:schemeClr val="tx2">
-                        <a:lumMod val="75000"/>
-                      </a:schemeClr>
-                    </a:solidFill>
-                  </a:tcPr>
-                </a:tc>
-                <a:tc>
-                  <a:txBody>
-                    <a:bodyPr/>
-                    <a:lstStyle/>
-                    <a:p>
-                      <a:pPr algn="ctr"/>
-                      <a:r>
-                        <a:rPr lang="de-DE" dirty="0"/>
-                        <a:t>Bis wann?</a:t>
                       </a:r>
                     </a:p>
                   </a:txBody>
@@ -10096,8 +9728,30 @@
                     <a:p>
                       <a:pPr algn="ctr"/>
                       <a:r>
-                        <a:rPr lang="de-DE" dirty="0"/>
-                        <a:t>Tom Haupt</a:t>
+                        <a:rPr lang="de-DE" dirty="0">
+                          <a:solidFill>
+                            <a:schemeClr val="tx1"/>
+                          </a:solidFill>
+                        </a:rPr>
+                        <a:t>Corinna /</a:t>
+                      </a:r>
+                      <a:r>
+                        <a:rPr lang="de-DE" dirty="0">
+                          <a:solidFill>
+                            <a:schemeClr val="accent6"/>
+                          </a:solidFill>
+                        </a:rPr>
+                        <a:t> Tom </a:t>
+                      </a:r>
+                      <a:r>
+                        <a:rPr lang="de-DE" dirty="0">
+                          <a:solidFill>
+                            <a:schemeClr val="accent2">
+                              <a:lumMod val="75000"/>
+                            </a:schemeClr>
+                          </a:solidFill>
+                        </a:rPr>
+                        <a:t>/ Leon </a:t>
                       </a:r>
                     </a:p>
                   </a:txBody>
@@ -10148,61 +9802,52 @@
                     <a:p>
                       <a:pPr algn="ctr"/>
                       <a:r>
-                        <a:rPr lang="de-DE" dirty="0"/>
-                        <a:t>Erstellung Level 1</a:t>
+                        <a:rPr lang="de-DE" dirty="0">
+                          <a:solidFill>
+                            <a:schemeClr val="tx1"/>
+                          </a:solidFill>
+                        </a:rPr>
+                        <a:t>Level </a:t>
                       </a:r>
-                    </a:p>
-                  </a:txBody>
-                  <a:tcPr>
-                    <a:lnL w="12700" cap="flat" cmpd="sng" algn="ctr">
-                      <a:solidFill>
-                        <a:schemeClr val="tx1"/>
-                      </a:solidFill>
-                      <a:prstDash val="solid"/>
-                      <a:round/>
-                      <a:headEnd type="none" w="med" len="med"/>
-                      <a:tailEnd type="none" w="med" len="med"/>
-                    </a:lnL>
-                    <a:lnR w="12700" cap="flat" cmpd="sng" algn="ctr">
-                      <a:solidFill>
-                        <a:schemeClr val="tx1"/>
-                      </a:solidFill>
-                      <a:prstDash val="solid"/>
-                      <a:round/>
-                      <a:headEnd type="none" w="med" len="med"/>
-                      <a:tailEnd type="none" w="med" len="med"/>
-                    </a:lnR>
-                    <a:lnT w="12700" cap="flat" cmpd="sng" algn="ctr">
-                      <a:solidFill>
-                        <a:schemeClr val="tx1"/>
-                      </a:solidFill>
-                      <a:prstDash val="solid"/>
-                      <a:round/>
-                      <a:headEnd type="none" w="med" len="med"/>
-                      <a:tailEnd type="none" w="med" len="med"/>
-                    </a:lnT>
-                    <a:lnB w="12700" cap="flat" cmpd="sng" algn="ctr">
-                      <a:solidFill>
-                        <a:schemeClr val="tx1"/>
-                      </a:solidFill>
-                      <a:prstDash val="solid"/>
-                      <a:round/>
-                      <a:headEnd type="none" w="med" len="med"/>
-                      <a:tailEnd type="none" w="med" len="med"/>
-                    </a:lnB>
-                    <a:noFill/>
-                  </a:tcPr>
-                </a:tc>
-                <a:tc>
-                  <a:txBody>
-                    <a:bodyPr/>
-                    <a:lstStyle/>
-                    <a:p>
-                      <a:pPr algn="ctr"/>
                       <a:r>
-                        <a:rPr lang="de-DE" dirty="0"/>
-                        <a:t>KW 35</a:t>
+                        <a:rPr lang="de-DE" dirty="0" err="1">
+                          <a:solidFill>
+                            <a:schemeClr val="tx1"/>
+                          </a:solidFill>
+                        </a:rPr>
+                        <a:t>Abschnit</a:t>
                       </a:r>
+                      <a:r>
+                        <a:rPr lang="de-DE" dirty="0">
+                          <a:solidFill>
+                            <a:schemeClr val="tx1"/>
+                          </a:solidFill>
+                        </a:rPr>
+                        <a:t> 2 / </a:t>
+                      </a:r>
+                      <a:r>
+                        <a:rPr lang="de-DE" dirty="0">
+                          <a:solidFill>
+                            <a:schemeClr val="accent6"/>
+                          </a:solidFill>
+                        </a:rPr>
+                        <a:t>Erstellung Level 1 / </a:t>
+                      </a:r>
+                      <a:r>
+                        <a:rPr lang="de-DE" dirty="0">
+                          <a:solidFill>
+                            <a:schemeClr val="accent2">
+                              <a:lumMod val="75000"/>
+                            </a:schemeClr>
+                          </a:solidFill>
+                        </a:rPr>
+                        <a:t>Level 4</a:t>
+                      </a:r>
+                      <a:endParaRPr lang="de-DE" dirty="0">
+                        <a:solidFill>
+                          <a:schemeClr val="accent6"/>
+                        </a:solidFill>
+                      </a:endParaRPr>
                     </a:p>
                   </a:txBody>
                   <a:tcPr>
@@ -10363,8 +10008,38 @@
                     <a:p>
                       <a:pPr algn="ctr"/>
                       <a:r>
-                        <a:rPr lang="de-DE" dirty="0"/>
-                        <a:t>Tom Haupt</a:t>
+                        <a:rPr lang="de-DE" dirty="0">
+                          <a:solidFill>
+                            <a:schemeClr val="tx1"/>
+                          </a:solidFill>
+                        </a:rPr>
+                        <a:t>Corinna / </a:t>
+                      </a:r>
+                      <a:r>
+                        <a:rPr lang="de-DE" dirty="0">
+                          <a:solidFill>
+                            <a:schemeClr val="accent6"/>
+                          </a:solidFill>
+                        </a:rPr>
+                        <a:t>Tom / </a:t>
+                      </a:r>
+                      <a:r>
+                        <a:rPr lang="de-DE" dirty="0">
+                          <a:solidFill>
+                            <a:schemeClr val="accent2">
+                              <a:lumMod val="75000"/>
+                            </a:schemeClr>
+                          </a:solidFill>
+                        </a:rPr>
+                        <a:t>Leon</a:t>
+                      </a:r>
+                      <a:r>
+                        <a:rPr lang="de-DE" dirty="0">
+                          <a:solidFill>
+                            <a:srgbClr val="0070C0"/>
+                          </a:solidFill>
+                        </a:rPr>
+                        <a:t>/ Mirco</a:t>
                       </a:r>
                     </a:p>
                   </a:txBody>
@@ -10415,60 +10090,38 @@
                     <a:p>
                       <a:pPr algn="ctr"/>
                       <a:r>
-                        <a:rPr lang="de-DE" dirty="0"/>
-                        <a:t>Menü</a:t>
+                        <a:rPr lang="de-DE" dirty="0">
+                          <a:solidFill>
+                            <a:schemeClr val="tx1"/>
+                          </a:solidFill>
+                        </a:rPr>
+                        <a:t>Level Abschnitt 3 / </a:t>
                       </a:r>
-                    </a:p>
-                  </a:txBody>
-                  <a:tcPr>
-                    <a:lnL w="12700" cap="flat" cmpd="sng" algn="ctr">
-                      <a:solidFill>
-                        <a:schemeClr val="tx1"/>
-                      </a:solidFill>
-                      <a:prstDash val="solid"/>
-                      <a:round/>
-                      <a:headEnd type="none" w="med" len="med"/>
-                      <a:tailEnd type="none" w="med" len="med"/>
-                    </a:lnL>
-                    <a:lnR w="12700" cap="flat" cmpd="sng" algn="ctr">
-                      <a:solidFill>
-                        <a:schemeClr val="tx1"/>
-                      </a:solidFill>
-                      <a:prstDash val="solid"/>
-                      <a:round/>
-                      <a:headEnd type="none" w="med" len="med"/>
-                      <a:tailEnd type="none" w="med" len="med"/>
-                    </a:lnR>
-                    <a:lnT w="12700" cap="flat" cmpd="sng" algn="ctr">
-                      <a:solidFill>
-                        <a:schemeClr val="tx1"/>
-                      </a:solidFill>
-                      <a:prstDash val="solid"/>
-                      <a:round/>
-                      <a:headEnd type="none" w="med" len="med"/>
-                      <a:tailEnd type="none" w="med" len="med"/>
-                    </a:lnT>
-                    <a:lnB w="12700" cap="flat" cmpd="sng" algn="ctr">
-                      <a:solidFill>
-                        <a:schemeClr val="tx1"/>
-                      </a:solidFill>
-                      <a:prstDash val="solid"/>
-                      <a:round/>
-                      <a:headEnd type="none" w="med" len="med"/>
-                      <a:tailEnd type="none" w="med" len="med"/>
-                    </a:lnB>
-                    <a:noFill/>
-                  </a:tcPr>
-                </a:tc>
-                <a:tc>
-                  <a:txBody>
-                    <a:bodyPr/>
-                    <a:lstStyle/>
-                    <a:p>
-                      <a:pPr algn="ctr"/>
                       <a:r>
-                        <a:rPr lang="de-DE" dirty="0"/>
-                        <a:t>KW 35</a:t>
+                        <a:rPr lang="de-DE" dirty="0">
+                          <a:solidFill>
+                            <a:schemeClr val="accent6"/>
+                          </a:solidFill>
+                        </a:rPr>
+                        <a:t>Erstellung Hauptmenü / </a:t>
+                      </a:r>
+                      <a:r>
+                        <a:rPr lang="de-DE" dirty="0">
+                          <a:solidFill>
+                            <a:schemeClr val="accent2">
+                              <a:lumMod val="75000"/>
+                            </a:schemeClr>
+                          </a:solidFill>
+                        </a:rPr>
+                        <a:t>Kameraführung </a:t>
+                      </a:r>
+                      <a:r>
+                        <a:rPr lang="de-DE" dirty="0">
+                          <a:solidFill>
+                            <a:srgbClr val="0070C0"/>
+                          </a:solidFill>
+                        </a:rPr>
+                        <a:t>/ Level 3</a:t>
                       </a:r>
                     </a:p>
                   </a:txBody>
@@ -10630,8 +10283,20 @@
                     <a:p>
                       <a:pPr algn="ctr"/>
                       <a:r>
-                        <a:rPr lang="de-DE" dirty="0"/>
-                        <a:t>Tom Haupt</a:t>
+                        <a:rPr lang="de-DE" dirty="0">
+                          <a:solidFill>
+                            <a:schemeClr val="tx1"/>
+                          </a:solidFill>
+                        </a:rPr>
+                        <a:t>Corinna / </a:t>
+                      </a:r>
+                      <a:r>
+                        <a:rPr lang="de-DE" dirty="0">
+                          <a:solidFill>
+                            <a:schemeClr val="accent6"/>
+                          </a:solidFill>
+                        </a:rPr>
+                        <a:t>Tom</a:t>
                       </a:r>
                     </a:p>
                   </a:txBody>
@@ -10682,61 +10347,64 @@
                     <a:p>
                       <a:pPr algn="ctr"/>
                       <a:r>
-                        <a:rPr lang="de-DE" dirty="0" err="1"/>
+                        <a:rPr lang="de-DE" dirty="0">
+                          <a:solidFill>
+                            <a:schemeClr val="tx1"/>
+                          </a:solidFill>
+                        </a:rPr>
+                        <a:t>Level Abschnitt 4 </a:t>
+                      </a:r>
+                      <a:r>
+                        <a:rPr lang="de-DE" dirty="0">
+                          <a:solidFill>
+                            <a:schemeClr val="accent6"/>
+                          </a:solidFill>
+                        </a:rPr>
+                        <a:t>/ Erstellung </a:t>
+                      </a:r>
+                      <a:r>
+                        <a:rPr lang="de-DE" dirty="0" err="1">
+                          <a:solidFill>
+                            <a:schemeClr val="accent6"/>
+                          </a:solidFill>
+                        </a:rPr>
                         <a:t>Highscoresystem</a:t>
                       </a:r>
-                      <a:endParaRPr lang="de-DE" dirty="0"/>
-                    </a:p>
-                  </a:txBody>
-                  <a:tcPr>
-                    <a:lnL w="12700" cap="flat" cmpd="sng" algn="ctr">
-                      <a:solidFill>
-                        <a:schemeClr val="tx1"/>
-                      </a:solidFill>
-                      <a:prstDash val="solid"/>
-                      <a:round/>
-                      <a:headEnd type="none" w="med" len="med"/>
-                      <a:tailEnd type="none" w="med" len="med"/>
-                    </a:lnL>
-                    <a:lnR w="12700" cap="flat" cmpd="sng" algn="ctr">
-                      <a:solidFill>
-                        <a:schemeClr val="tx1"/>
-                      </a:solidFill>
-                      <a:prstDash val="solid"/>
-                      <a:round/>
-                      <a:headEnd type="none" w="med" len="med"/>
-                      <a:tailEnd type="none" w="med" len="med"/>
-                    </a:lnR>
-                    <a:lnT w="12700" cap="flat" cmpd="sng" algn="ctr">
-                      <a:solidFill>
-                        <a:schemeClr val="tx1"/>
-                      </a:solidFill>
-                      <a:prstDash val="solid"/>
-                      <a:round/>
-                      <a:headEnd type="none" w="med" len="med"/>
-                      <a:tailEnd type="none" w="med" len="med"/>
-                    </a:lnT>
-                    <a:lnB w="12700" cap="flat" cmpd="sng" algn="ctr">
-                      <a:solidFill>
-                        <a:schemeClr val="tx1"/>
-                      </a:solidFill>
-                      <a:prstDash val="solid"/>
-                      <a:round/>
-                      <a:headEnd type="none" w="med" len="med"/>
-                      <a:tailEnd type="none" w="med" len="med"/>
-                    </a:lnB>
-                    <a:noFill/>
-                  </a:tcPr>
-                </a:tc>
-                <a:tc>
-                  <a:txBody>
-                    <a:bodyPr/>
-                    <a:lstStyle/>
-                    <a:p>
-                      <a:pPr algn="ctr"/>
                       <a:r>
-                        <a:rPr lang="de-DE" dirty="0"/>
-                        <a:t>KW 36</a:t>
+                        <a:rPr lang="de-DE" dirty="0">
+                          <a:solidFill>
+                            <a:schemeClr val="accent6"/>
+                          </a:solidFill>
+                        </a:rPr>
+                        <a:t> / </a:t>
+                      </a:r>
+                      <a:r>
+                        <a:rPr lang="de-DE" dirty="0">
+                          <a:solidFill>
+                            <a:schemeClr val="accent2">
+                              <a:lumMod val="75000"/>
+                            </a:schemeClr>
+                          </a:solidFill>
+                        </a:rPr>
+                        <a:t>Erstellung</a:t>
+                      </a:r>
+                      <a:r>
+                        <a:rPr lang="de-DE" dirty="0">
+                          <a:solidFill>
+                            <a:schemeClr val="accent6"/>
+                          </a:solidFill>
+                        </a:rPr>
+                        <a:t> </a:t>
+                      </a:r>
+                      <a:r>
+                        <a:rPr lang="de-DE" dirty="0">
+                          <a:solidFill>
+                            <a:schemeClr val="accent2">
+                              <a:lumMod val="75000"/>
+                            </a:schemeClr>
+                          </a:solidFill>
+                        </a:rPr>
+                        <a:t>Gegner</a:t>
                       </a:r>
                     </a:p>
                   </a:txBody>
@@ -10897,7 +10565,10 @@
                     <a:lstStyle/>
                     <a:p>
                       <a:pPr algn="ctr"/>
-                      <a:endParaRPr lang="de-DE" dirty="0"/>
+                      <a:r>
+                        <a:rPr lang="de-DE" dirty="0"/>
+                        <a:t>Corinna</a:t>
+                      </a:r>
                     </a:p>
                   </a:txBody>
                   <a:tcPr>
@@ -10946,55 +10617,14 @@
                     <a:lstStyle/>
                     <a:p>
                       <a:pPr algn="ctr"/>
-                      <a:endParaRPr lang="de-DE" dirty="0"/>
-                    </a:p>
-                  </a:txBody>
-                  <a:tcPr>
-                    <a:lnL w="12700" cap="flat" cmpd="sng" algn="ctr">
-                      <a:solidFill>
-                        <a:schemeClr val="tx1"/>
-                      </a:solidFill>
-                      <a:prstDash val="solid"/>
-                      <a:round/>
-                      <a:headEnd type="none" w="med" len="med"/>
-                      <a:tailEnd type="none" w="med" len="med"/>
-                    </a:lnL>
-                    <a:lnR w="12700" cap="flat" cmpd="sng" algn="ctr">
-                      <a:solidFill>
-                        <a:schemeClr val="tx1"/>
-                      </a:solidFill>
-                      <a:prstDash val="solid"/>
-                      <a:round/>
-                      <a:headEnd type="none" w="med" len="med"/>
-                      <a:tailEnd type="none" w="med" len="med"/>
-                    </a:lnR>
-                    <a:lnT w="12700" cap="flat" cmpd="sng" algn="ctr">
-                      <a:solidFill>
-                        <a:schemeClr val="tx1"/>
-                      </a:solidFill>
-                      <a:prstDash val="solid"/>
-                      <a:round/>
-                      <a:headEnd type="none" w="med" len="med"/>
-                      <a:tailEnd type="none" w="med" len="med"/>
-                    </a:lnT>
-                    <a:lnB w="12700" cap="flat" cmpd="sng" algn="ctr">
-                      <a:solidFill>
-                        <a:schemeClr val="tx1"/>
-                      </a:solidFill>
-                      <a:prstDash val="solid"/>
-                      <a:round/>
-                      <a:headEnd type="none" w="med" len="med"/>
-                      <a:tailEnd type="none" w="med" len="med"/>
-                    </a:lnB>
-                    <a:noFill/>
-                  </a:tcPr>
-                </a:tc>
-                <a:tc>
-                  <a:txBody>
-                    <a:bodyPr/>
-                    <a:lstStyle/>
-                    <a:p>
-                      <a:pPr algn="ctr"/>
+                      <a:r>
+                        <a:rPr lang="de-DE" dirty="0"/>
+                        <a:t>Abschluss des Levels, </a:t>
+                      </a:r>
+                      <a:r>
+                        <a:rPr lang="de-DE" dirty="0" err="1"/>
+                        <a:t>Endcredits</a:t>
+                      </a:r>
                       <a:endParaRPr lang="de-DE" dirty="0"/>
                     </a:p>
                   </a:txBody>
@@ -11165,7 +10795,10 @@
                     <a:lstStyle/>
                     <a:p>
                       <a:pPr algn="ctr"/>
-                      <a:endParaRPr lang="de-DE" dirty="0"/>
+                      <a:r>
+                        <a:rPr lang="de-DE" dirty="0"/>
+                        <a:t>alle</a:t>
+                      </a:r>
                     </a:p>
                   </a:txBody>
                   <a:tcPr>
@@ -11218,65 +10851,26 @@
                     <a:bodyPr/>
                     <a:lstStyle/>
                     <a:p>
-                      <a:pPr algn="ctr"/>
+                      <a:pPr algn="ctr">
+                        <a:buNone/>
+                      </a:pPr>
+                      <a:r>
+                        <a:rPr lang="de-DE" b="1" dirty="0"/>
+                        <a:t>Meilenstein 3 </a:t>
+                      </a:r>
                       <a:r>
                         <a:rPr lang="de-DE" dirty="0"/>
-                        <a:t>Meilenstein 3</a:t>
+                        <a:t>erster kompletter </a:t>
                       </a:r>
                     </a:p>
-                  </a:txBody>
-                  <a:tcPr>
-                    <a:lnL w="12700" cap="flat" cmpd="sng" algn="ctr">
-                      <a:solidFill>
-                        <a:schemeClr val="tx1"/>
-                      </a:solidFill>
-                      <a:prstDash val="solid"/>
-                      <a:round/>
-                      <a:headEnd type="none" w="med" len="med"/>
-                      <a:tailEnd type="none" w="med" len="med"/>
-                    </a:lnL>
-                    <a:lnR w="12700" cap="flat" cmpd="sng" algn="ctr">
-                      <a:solidFill>
-                        <a:schemeClr val="tx1"/>
-                      </a:solidFill>
-                      <a:prstDash val="solid"/>
-                      <a:round/>
-                      <a:headEnd type="none" w="med" len="med"/>
-                      <a:tailEnd type="none" w="med" len="med"/>
-                    </a:lnR>
-                    <a:lnT w="12700" cap="flat" cmpd="sng" algn="ctr">
-                      <a:solidFill>
-                        <a:schemeClr val="tx1"/>
-                      </a:solidFill>
-                      <a:prstDash val="solid"/>
-                      <a:round/>
-                      <a:headEnd type="none" w="med" len="med"/>
-                      <a:tailEnd type="none" w="med" len="med"/>
-                    </a:lnT>
-                    <a:lnB w="12700" cap="flat" cmpd="sng" algn="ctr">
-                      <a:solidFill>
-                        <a:schemeClr val="tx1"/>
-                      </a:solidFill>
-                      <a:prstDash val="solid"/>
-                      <a:round/>
-                      <a:headEnd type="none" w="med" len="med"/>
-                      <a:tailEnd type="none" w="med" len="med"/>
-                    </a:lnB>
-                    <a:solidFill>
-                      <a:schemeClr val="accent2">
-                        <a:lumMod val="20000"/>
-                        <a:lumOff val="80000"/>
-                      </a:schemeClr>
-                    </a:solidFill>
-                  </a:tcPr>
-                </a:tc>
-                <a:tc>
-                  <a:txBody>
-                    <a:bodyPr/>
-                    <a:lstStyle/>
                     <a:p>
-                      <a:pPr algn="ctr"/>
-                      <a:endParaRPr lang="de-DE" dirty="0"/>
+                      <a:pPr algn="ctr">
+                        <a:buNone/>
+                      </a:pPr>
+                      <a:r>
+                        <a:rPr lang="de-DE" dirty="0"/>
+                        <a:t>Testlauf des Spiels</a:t>
+                      </a:r>
                     </a:p>
                   </a:txBody>
                   <a:tcPr>
@@ -11441,7 +11035,10 @@
                     <a:lstStyle/>
                     <a:p>
                       <a:pPr algn="ctr"/>
-                      <a:endParaRPr lang="de-DE" dirty="0"/>
+                      <a:r>
+                        <a:rPr lang="de-DE" dirty="0"/>
+                        <a:t>alle</a:t>
+                      </a:r>
                     </a:p>
                   </a:txBody>
                   <a:tcPr>
@@ -11490,56 +11087,10 @@
                     <a:lstStyle/>
                     <a:p>
                       <a:pPr algn="ctr"/>
-                      <a:endParaRPr lang="de-DE"/>
-                    </a:p>
-                  </a:txBody>
-                  <a:tcPr>
-                    <a:lnL w="12700" cap="flat" cmpd="sng" algn="ctr">
-                      <a:solidFill>
-                        <a:schemeClr val="tx1"/>
-                      </a:solidFill>
-                      <a:prstDash val="solid"/>
-                      <a:round/>
-                      <a:headEnd type="none" w="med" len="med"/>
-                      <a:tailEnd type="none" w="med" len="med"/>
-                    </a:lnL>
-                    <a:lnR w="12700" cap="flat" cmpd="sng" algn="ctr">
-                      <a:solidFill>
-                        <a:schemeClr val="tx1"/>
-                      </a:solidFill>
-                      <a:prstDash val="solid"/>
-                      <a:round/>
-                      <a:headEnd type="none" w="med" len="med"/>
-                      <a:tailEnd type="none" w="med" len="med"/>
-                    </a:lnR>
-                    <a:lnT w="12700" cap="flat" cmpd="sng" algn="ctr">
-                      <a:solidFill>
-                        <a:schemeClr val="tx1"/>
-                      </a:solidFill>
-                      <a:prstDash val="solid"/>
-                      <a:round/>
-                      <a:headEnd type="none" w="med" len="med"/>
-                      <a:tailEnd type="none" w="med" len="med"/>
-                    </a:lnT>
-                    <a:lnB w="12700" cap="flat" cmpd="sng" algn="ctr">
-                      <a:solidFill>
-                        <a:schemeClr val="tx1"/>
-                      </a:solidFill>
-                      <a:prstDash val="solid"/>
-                      <a:round/>
-                      <a:headEnd type="none" w="med" len="med"/>
-                      <a:tailEnd type="none" w="med" len="med"/>
-                    </a:lnB>
-                    <a:noFill/>
-                  </a:tcPr>
-                </a:tc>
-                <a:tc>
-                  <a:txBody>
-                    <a:bodyPr/>
-                    <a:lstStyle/>
-                    <a:p>
-                      <a:pPr algn="ctr"/>
-                      <a:endParaRPr lang="de-DE" dirty="0"/>
+                      <a:r>
+                        <a:rPr lang="de-DE" dirty="0"/>
+                        <a:t>Verbesserung von Bugs</a:t>
+                      </a:r>
                     </a:p>
                   </a:txBody>
                   <a:tcPr>
@@ -11699,7 +11250,10 @@
                     <a:lstStyle/>
                     <a:p>
                       <a:pPr algn="ctr"/>
-                      <a:endParaRPr lang="de-DE"/>
+                      <a:r>
+                        <a:rPr lang="de-DE" dirty="0"/>
+                        <a:t>alle</a:t>
+                      </a:r>
                     </a:p>
                   </a:txBody>
                   <a:tcPr>
@@ -11748,56 +11302,10 @@
                     <a:lstStyle/>
                     <a:p>
                       <a:pPr algn="ctr"/>
-                      <a:endParaRPr lang="de-DE" dirty="0"/>
-                    </a:p>
-                  </a:txBody>
-                  <a:tcPr>
-                    <a:lnL w="12700" cap="flat" cmpd="sng" algn="ctr">
-                      <a:solidFill>
-                        <a:schemeClr val="tx1"/>
-                      </a:solidFill>
-                      <a:prstDash val="solid"/>
-                      <a:round/>
-                      <a:headEnd type="none" w="med" len="med"/>
-                      <a:tailEnd type="none" w="med" len="med"/>
-                    </a:lnL>
-                    <a:lnR w="12700" cap="flat" cmpd="sng" algn="ctr">
-                      <a:solidFill>
-                        <a:schemeClr val="tx1"/>
-                      </a:solidFill>
-                      <a:prstDash val="solid"/>
-                      <a:round/>
-                      <a:headEnd type="none" w="med" len="med"/>
-                      <a:tailEnd type="none" w="med" len="med"/>
-                    </a:lnR>
-                    <a:lnT w="12700" cap="flat" cmpd="sng" algn="ctr">
-                      <a:solidFill>
-                        <a:schemeClr val="tx1"/>
-                      </a:solidFill>
-                      <a:prstDash val="solid"/>
-                      <a:round/>
-                      <a:headEnd type="none" w="med" len="med"/>
-                      <a:tailEnd type="none" w="med" len="med"/>
-                    </a:lnT>
-                    <a:lnB w="12700" cap="flat" cmpd="sng" algn="ctr">
-                      <a:solidFill>
-                        <a:schemeClr val="tx1"/>
-                      </a:solidFill>
-                      <a:prstDash val="solid"/>
-                      <a:round/>
-                      <a:headEnd type="none" w="med" len="med"/>
-                      <a:tailEnd type="none" w="med" len="med"/>
-                    </a:lnB>
-                    <a:noFill/>
-                  </a:tcPr>
-                </a:tc>
-                <a:tc>
-                  <a:txBody>
-                    <a:bodyPr/>
-                    <a:lstStyle/>
-                    <a:p>
-                      <a:pPr algn="ctr"/>
-                      <a:endParaRPr lang="de-DE" dirty="0"/>
+                      <a:r>
+                        <a:rPr lang="de-DE" dirty="0"/>
+                        <a:t>Verbesserung von Bugs</a:t>
+                      </a:r>
                     </a:p>
                   </a:txBody>
                   <a:tcPr>
@@ -11957,7 +11465,10 @@
                     <a:lstStyle/>
                     <a:p>
                       <a:pPr algn="ctr"/>
-                      <a:endParaRPr lang="de-DE" dirty="0"/>
+                      <a:r>
+                        <a:rPr lang="de-DE" dirty="0"/>
+                        <a:t>alle</a:t>
+                      </a:r>
                     </a:p>
                   </a:txBody>
                   <a:tcPr>
@@ -12006,56 +11517,10 @@
                     <a:lstStyle/>
                     <a:p>
                       <a:pPr algn="ctr"/>
-                      <a:endParaRPr lang="de-DE" dirty="0"/>
-                    </a:p>
-                  </a:txBody>
-                  <a:tcPr>
-                    <a:lnL w="12700" cap="flat" cmpd="sng" algn="ctr">
-                      <a:solidFill>
-                        <a:schemeClr val="tx1"/>
-                      </a:solidFill>
-                      <a:prstDash val="solid"/>
-                      <a:round/>
-                      <a:headEnd type="none" w="med" len="med"/>
-                      <a:tailEnd type="none" w="med" len="med"/>
-                    </a:lnL>
-                    <a:lnR w="12700" cap="flat" cmpd="sng" algn="ctr">
-                      <a:solidFill>
-                        <a:schemeClr val="tx1"/>
-                      </a:solidFill>
-                      <a:prstDash val="solid"/>
-                      <a:round/>
-                      <a:headEnd type="none" w="med" len="med"/>
-                      <a:tailEnd type="none" w="med" len="med"/>
-                    </a:lnR>
-                    <a:lnT w="12700" cap="flat" cmpd="sng" algn="ctr">
-                      <a:solidFill>
-                        <a:schemeClr val="tx1"/>
-                      </a:solidFill>
-                      <a:prstDash val="solid"/>
-                      <a:round/>
-                      <a:headEnd type="none" w="med" len="med"/>
-                      <a:tailEnd type="none" w="med" len="med"/>
-                    </a:lnT>
-                    <a:lnB w="12700" cap="flat" cmpd="sng" algn="ctr">
-                      <a:solidFill>
-                        <a:schemeClr val="tx1"/>
-                      </a:solidFill>
-                      <a:prstDash val="solid"/>
-                      <a:round/>
-                      <a:headEnd type="none" w="med" len="med"/>
-                      <a:tailEnd type="none" w="med" len="med"/>
-                    </a:lnB>
-                    <a:noFill/>
-                  </a:tcPr>
-                </a:tc>
-                <a:tc>
-                  <a:txBody>
-                    <a:bodyPr/>
-                    <a:lstStyle/>
-                    <a:p>
-                      <a:pPr algn="ctr"/>
-                      <a:endParaRPr lang="de-DE" dirty="0"/>
+                      <a:r>
+                        <a:rPr lang="de-DE" dirty="0"/>
+                        <a:t>Finalisierung und Upload.</a:t>
+                      </a:r>
                     </a:p>
                   </a:txBody>
                   <a:tcPr>
@@ -12227,7 +11692,7 @@
                       <a:pPr algn="ctr"/>
                       <a:r>
                         <a:rPr lang="de-DE" dirty="0"/>
-                        <a:t>Finale Abgabe</a:t>
+                        <a:t>alle</a:t>
                       </a:r>
                     </a:p>
                   </a:txBody>
@@ -12282,61 +11747,10 @@
                     <a:lstStyle/>
                     <a:p>
                       <a:pPr algn="ctr"/>
-                      <a:endParaRPr lang="de-DE" dirty="0"/>
-                    </a:p>
-                  </a:txBody>
-                  <a:tcPr>
-                    <a:lnL w="12700" cap="flat" cmpd="sng" algn="ctr">
-                      <a:solidFill>
-                        <a:schemeClr val="tx1"/>
-                      </a:solidFill>
-                      <a:prstDash val="solid"/>
-                      <a:round/>
-                      <a:headEnd type="none" w="med" len="med"/>
-                      <a:tailEnd type="none" w="med" len="med"/>
-                    </a:lnL>
-                    <a:lnR w="12700" cap="flat" cmpd="sng" algn="ctr">
-                      <a:solidFill>
-                        <a:schemeClr val="tx1"/>
-                      </a:solidFill>
-                      <a:prstDash val="solid"/>
-                      <a:round/>
-                      <a:headEnd type="none" w="med" len="med"/>
-                      <a:tailEnd type="none" w="med" len="med"/>
-                    </a:lnR>
-                    <a:lnT w="12700" cap="flat" cmpd="sng" algn="ctr">
-                      <a:solidFill>
-                        <a:schemeClr val="tx1"/>
-                      </a:solidFill>
-                      <a:prstDash val="solid"/>
-                      <a:round/>
-                      <a:headEnd type="none" w="med" len="med"/>
-                      <a:tailEnd type="none" w="med" len="med"/>
-                    </a:lnT>
-                    <a:lnB w="12700" cap="flat" cmpd="sng" algn="ctr">
-                      <a:solidFill>
-                        <a:schemeClr val="tx1"/>
-                      </a:solidFill>
-                      <a:prstDash val="solid"/>
-                      <a:round/>
-                      <a:headEnd type="none" w="med" len="med"/>
-                      <a:tailEnd type="none" w="med" len="med"/>
-                    </a:lnB>
-                    <a:solidFill>
-                      <a:schemeClr val="accent2">
-                        <a:lumMod val="40000"/>
-                        <a:lumOff val="60000"/>
-                      </a:schemeClr>
-                    </a:solidFill>
-                  </a:tcPr>
-                </a:tc>
-                <a:tc>
-                  <a:txBody>
-                    <a:bodyPr/>
-                    <a:lstStyle/>
-                    <a:p>
-                      <a:pPr algn="ctr"/>
-                      <a:endParaRPr lang="de-DE" dirty="0"/>
+                      <a:r>
+                        <a:rPr lang="de-DE" dirty="0"/>
+                        <a:t>Finale Abgabe</a:t>
+                      </a:r>
                     </a:p>
                   </a:txBody>
                   <a:tcPr>
@@ -12523,7 +11937,7 @@
                       <a:pPr algn="ctr"/>
                       <a:r>
                         <a:rPr lang="de-DE" dirty="0"/>
-                        <a:t>Finale Präsentation </a:t>
+                        <a:t>alle</a:t>
                       </a:r>
                     </a:p>
                   </a:txBody>
@@ -12573,56 +11987,10 @@
                     <a:lstStyle/>
                     <a:p>
                       <a:pPr algn="ctr"/>
-                      <a:endParaRPr lang="de-DE" dirty="0"/>
-                    </a:p>
-                  </a:txBody>
-                  <a:tcPr>
-                    <a:lnL w="12700" cap="flat" cmpd="sng" algn="ctr">
-                      <a:solidFill>
-                        <a:schemeClr val="tx1"/>
-                      </a:solidFill>
-                      <a:prstDash val="solid"/>
-                      <a:round/>
-                      <a:headEnd type="none" w="med" len="med"/>
-                      <a:tailEnd type="none" w="med" len="med"/>
-                    </a:lnL>
-                    <a:lnR w="12700" cap="flat" cmpd="sng" algn="ctr">
-                      <a:solidFill>
-                        <a:schemeClr val="tx1"/>
-                      </a:solidFill>
-                      <a:prstDash val="solid"/>
-                      <a:round/>
-                      <a:headEnd type="none" w="med" len="med"/>
-                      <a:tailEnd type="none" w="med" len="med"/>
-                    </a:lnR>
-                    <a:lnT w="12700" cap="flat" cmpd="sng" algn="ctr">
-                      <a:solidFill>
-                        <a:schemeClr val="tx1"/>
-                      </a:solidFill>
-                      <a:prstDash val="solid"/>
-                      <a:round/>
-                      <a:headEnd type="none" w="med" len="med"/>
-                      <a:tailEnd type="none" w="med" len="med"/>
-                    </a:lnT>
-                    <a:lnB w="12700" cap="flat" cmpd="sng" algn="ctr">
-                      <a:solidFill>
-                        <a:schemeClr val="tx1"/>
-                      </a:solidFill>
-                      <a:prstDash val="solid"/>
-                      <a:round/>
-                      <a:headEnd type="none" w="med" len="med"/>
-                      <a:tailEnd type="none" w="med" len="med"/>
-                    </a:lnB>
-                    <a:noFill/>
-                  </a:tcPr>
-                </a:tc>
-                <a:tc>
-                  <a:txBody>
-                    <a:bodyPr/>
-                    <a:lstStyle/>
-                    <a:p>
-                      <a:pPr algn="ctr"/>
-                      <a:endParaRPr lang="de-DE" dirty="0"/>
+                      <a:r>
+                        <a:rPr lang="de-DE" dirty="0"/>
+                        <a:t>Finale Präsentation</a:t>
+                      </a:r>
                     </a:p>
                   </a:txBody>
                   <a:tcPr>
@@ -13207,7 +12575,7 @@
             </a:pPr>
             <a:r>
               <a:rPr lang="de-DE" sz="2400" dirty="0"/>
-              <a:t>Fertigstellung der Kugel-Eigenschaften</a:t>
+              <a:t>15.07 Fertigstellung des Grundgerüst / Kugel-Eigenschaften</a:t>
             </a:r>
           </a:p>
           <a:p>
@@ -13217,7 +12585,7 @@
             </a:pPr>
             <a:r>
               <a:rPr lang="de-DE" sz="2400" dirty="0"/>
-              <a:t>Fertigstellung aller Level</a:t>
+              <a:t>01.08 Fertigstellung aller Level</a:t>
             </a:r>
           </a:p>
           <a:p>
@@ -13227,25 +12595,11 @@
             </a:pPr>
             <a:r>
               <a:rPr lang="de-DE" sz="2400" dirty="0"/>
-              <a:t>Testlauf des Spiels</a:t>
+              <a:t>01.09 Testlauf des Spiels</a:t>
             </a:r>
           </a:p>
           <a:p>
-            <a:pPr marL="285750" indent="-285750">
-              <a:buFont typeface="Arial" panose="020B0604020202020204" pitchFamily="34" charset="0"/>
-              <a:buChar char="•"/>
-            </a:pPr>
             <a:endParaRPr lang="de-DE" sz="2400" dirty="0"/>
-          </a:p>
-          <a:p>
-            <a:pPr marL="285750" indent="-285750">
-              <a:buFont typeface="Arial" panose="020B0604020202020204" pitchFamily="34" charset="0"/>
-              <a:buChar char="•"/>
-            </a:pPr>
-            <a:r>
-              <a:rPr lang="de-DE" sz="2400" dirty="0"/>
-              <a:t>???</a:t>
-            </a:r>
           </a:p>
         </p:txBody>
       </p:sp>
@@ -13543,7 +12897,7 @@
           <a:p>
             <a:r>
               <a:rPr lang="de-DE" dirty="0"/>
-              <a:t>5. Größtes Risiko</a:t>
+              <a:t>6. Größtes Risiko</a:t>
             </a:r>
           </a:p>
         </p:txBody>
@@ -13777,7 +13131,7 @@
             </a:pPr>
             <a:r>
               <a:rPr lang="de-DE" dirty="0"/>
-              <a:t>Nicht Einhaltung des Zeitplans</a:t>
+              <a:t>Nicht Einhaltung des Zeitplans -&gt; Verzögerung der Abgabe</a:t>
             </a:r>
           </a:p>
           <a:p>
@@ -13787,7 +13141,15 @@
             </a:pPr>
             <a:r>
               <a:rPr lang="de-DE" dirty="0"/>
-              <a:t>Probleme mit dem Repository</a:t>
+              <a:t>Probleme mit dem Repository, </a:t>
+            </a:r>
+            <a:r>
+              <a:rPr lang="de-DE" dirty="0" err="1"/>
+              <a:t>Merge</a:t>
+            </a:r>
+            <a:r>
+              <a:rPr lang="de-DE" dirty="0"/>
+              <a:t> Konflikte</a:t>
             </a:r>
           </a:p>
           <a:p>
@@ -13797,7 +13159,7 @@
             </a:pPr>
             <a:r>
               <a:rPr lang="de-DE" dirty="0"/>
-              <a:t>Probleme in der Kommunikation</a:t>
+              <a:t>Probleme in der Kommunikation der Gruppenmitglieder</a:t>
             </a:r>
           </a:p>
           <a:p>
@@ -13807,17 +13169,7 @@
             </a:pPr>
             <a:r>
               <a:rPr lang="de-DE" dirty="0"/>
-              <a:t>Aufgaben doppelt bearbeitet</a:t>
-            </a:r>
-          </a:p>
-          <a:p>
-            <a:pPr marL="285750" indent="-285750">
-              <a:buFont typeface="Arial" panose="020B0604020202020204" pitchFamily="34" charset="0"/>
-              <a:buChar char="•"/>
-            </a:pPr>
-            <a:r>
-              <a:rPr lang="de-DE" dirty="0"/>
-              <a:t>???</a:t>
+              <a:t>Aufgabenverteilung nicht deutlich kommuniziert, sodass Aufgaben doppelt bearbeitet werden</a:t>
             </a:r>
           </a:p>
         </p:txBody>

</xml_diff>